<commit_message>
Updated UG and DG to reflect enhancement in ProfilePic
</commit_message>
<xml_diff>
--- a/docs/diagrams/DeleteProfilePicSequenceDiagram.pptx
+++ b/docs/diagrams/DeleteProfilePicSequenceDiagram.pptx
@@ -126,6 +126,10 @@
 </p:presentation>
 </file>
 
+<file path=ppt/revisionInfo.xml><?xml version="1.0" encoding="utf-8"?>
+<p1510:revInfo xmlns:a="http://schemas.openxmlformats.org/drawingml/2006/main" xmlns:r="http://schemas.openxmlformats.org/officeDocument/2006/relationships" xmlns:p1510="http://schemas.microsoft.com/office/powerpoint/2015/10/main"/>
+</file>
+
 <file path=ppt/notesMasters/notesMaster1.xml><?xml version="1.0" encoding="utf-8"?>
 <p:notesMaster xmlns:a="http://schemas.openxmlformats.org/drawingml/2006/main" xmlns:r="http://schemas.openxmlformats.org/officeDocument/2006/relationships" xmlns:p="http://schemas.openxmlformats.org/presentationml/2006/main">
   <p:cSld>
@@ -208,7 +212,7 @@
           <a:p>
             <a:fld id="{F5CC4B3F-88C1-4FFA-B1B6-F41C21DC6924}" type="datetimeFigureOut">
               <a:rPr lang="en-US" smtClean="0"/>
-              <a:t>10/24/2017</a:t>
+              <a:t>10/30/2017</a:t>
             </a:fld>
             <a:endParaRPr lang="en-US"/>
           </a:p>
@@ -738,7 +742,7 @@
           <a:p>
             <a:fld id="{78C97017-6FC3-485B-9764-EAC9E56C1D49}" type="datetimeFigureOut">
               <a:rPr lang="en-US" smtClean="0"/>
-              <a:t>10/24/2017</a:t>
+              <a:t>10/30/2017</a:t>
             </a:fld>
             <a:endParaRPr lang="en-US"/>
           </a:p>
@@ -906,7 +910,7 @@
           <a:p>
             <a:fld id="{78C97017-6FC3-485B-9764-EAC9E56C1D49}" type="datetimeFigureOut">
               <a:rPr lang="en-US" smtClean="0"/>
-              <a:t>10/24/2017</a:t>
+              <a:t>10/30/2017</a:t>
             </a:fld>
             <a:endParaRPr lang="en-US"/>
           </a:p>
@@ -1084,7 +1088,7 @@
           <a:p>
             <a:fld id="{78C97017-6FC3-485B-9764-EAC9E56C1D49}" type="datetimeFigureOut">
               <a:rPr lang="en-US" smtClean="0"/>
-              <a:t>10/24/2017</a:t>
+              <a:t>10/30/2017</a:t>
             </a:fld>
             <a:endParaRPr lang="en-US"/>
           </a:p>
@@ -1252,7 +1256,7 @@
           <a:p>
             <a:fld id="{78C97017-6FC3-485B-9764-EAC9E56C1D49}" type="datetimeFigureOut">
               <a:rPr lang="en-US" smtClean="0"/>
-              <a:t>10/24/2017</a:t>
+              <a:t>10/30/2017</a:t>
             </a:fld>
             <a:endParaRPr lang="en-US"/>
           </a:p>
@@ -1497,7 +1501,7 @@
           <a:p>
             <a:fld id="{78C97017-6FC3-485B-9764-EAC9E56C1D49}" type="datetimeFigureOut">
               <a:rPr lang="en-US" smtClean="0"/>
-              <a:t>10/24/2017</a:t>
+              <a:t>10/30/2017</a:t>
             </a:fld>
             <a:endParaRPr lang="en-US"/>
           </a:p>
@@ -1782,7 +1786,7 @@
           <a:p>
             <a:fld id="{78C97017-6FC3-485B-9764-EAC9E56C1D49}" type="datetimeFigureOut">
               <a:rPr lang="en-US" smtClean="0"/>
-              <a:t>10/24/2017</a:t>
+              <a:t>10/30/2017</a:t>
             </a:fld>
             <a:endParaRPr lang="en-US"/>
           </a:p>
@@ -2201,7 +2205,7 @@
           <a:p>
             <a:fld id="{78C97017-6FC3-485B-9764-EAC9E56C1D49}" type="datetimeFigureOut">
               <a:rPr lang="en-US" smtClean="0"/>
-              <a:t>10/24/2017</a:t>
+              <a:t>10/30/2017</a:t>
             </a:fld>
             <a:endParaRPr lang="en-US"/>
           </a:p>
@@ -2318,7 +2322,7 @@
           <a:p>
             <a:fld id="{78C97017-6FC3-485B-9764-EAC9E56C1D49}" type="datetimeFigureOut">
               <a:rPr lang="en-US" smtClean="0"/>
-              <a:t>10/24/2017</a:t>
+              <a:t>10/30/2017</a:t>
             </a:fld>
             <a:endParaRPr lang="en-US"/>
           </a:p>
@@ -2413,7 +2417,7 @@
           <a:p>
             <a:fld id="{78C97017-6FC3-485B-9764-EAC9E56C1D49}" type="datetimeFigureOut">
               <a:rPr lang="en-US" smtClean="0"/>
-              <a:t>10/24/2017</a:t>
+              <a:t>10/30/2017</a:t>
             </a:fld>
             <a:endParaRPr lang="en-US"/>
           </a:p>
@@ -2688,7 +2692,7 @@
           <a:p>
             <a:fld id="{78C97017-6FC3-485B-9764-EAC9E56C1D49}" type="datetimeFigureOut">
               <a:rPr lang="en-US" smtClean="0"/>
-              <a:t>10/24/2017</a:t>
+              <a:t>10/30/2017</a:t>
             </a:fld>
             <a:endParaRPr lang="en-US"/>
           </a:p>
@@ -2940,7 +2944,7 @@
           <a:p>
             <a:fld id="{78C97017-6FC3-485B-9764-EAC9E56C1D49}" type="datetimeFigureOut">
               <a:rPr lang="en-US" smtClean="0"/>
-              <a:t>10/24/2017</a:t>
+              <a:t>10/30/2017</a:t>
             </a:fld>
             <a:endParaRPr lang="en-US"/>
           </a:p>
@@ -3151,7 +3155,7 @@
           <a:p>
             <a:fld id="{78C97017-6FC3-485B-9764-EAC9E56C1D49}" type="datetimeFigureOut">
               <a:rPr lang="en-US" smtClean="0"/>
-              <a:t>10/24/2017</a:t>
+              <a:t>10/30/2017</a:t>
             </a:fld>
             <a:endParaRPr lang="en-US"/>
           </a:p>
@@ -3534,8 +3538,8 @@
         </p:nvSpPr>
         <p:spPr>
           <a:xfrm>
-            <a:off x="723900" y="228600"/>
-            <a:ext cx="11163300" cy="5181600"/>
+            <a:off x="-1219200" y="228600"/>
+            <a:ext cx="13868400" cy="6019800"/>
           </a:xfrm>
           <a:prstGeom prst="roundRect">
             <a:avLst>
@@ -3587,7 +3591,7 @@
         </p:nvSpPr>
         <p:spPr>
           <a:xfrm>
-            <a:off x="883145" y="543946"/>
+            <a:off x="-1059955" y="543946"/>
             <a:ext cx="1455629" cy="346760"/>
           </a:xfrm>
           <a:prstGeom prst="rect">
@@ -3656,8 +3660,8 @@
         </p:nvCxnSpPr>
         <p:spPr>
           <a:xfrm flipH="1">
-            <a:off x="1610959" y="907617"/>
-            <a:ext cx="1" cy="4426383"/>
+            <a:off x="-370047" y="907617"/>
+            <a:ext cx="37908" cy="5264583"/>
           </a:xfrm>
           <a:prstGeom prst="line">
             <a:avLst/>
@@ -3693,8 +3697,8 @@
         </p:nvSpPr>
         <p:spPr>
           <a:xfrm>
-            <a:off x="1538951" y="1258311"/>
-            <a:ext cx="116191" cy="3618488"/>
+            <a:off x="-404149" y="1258310"/>
+            <a:ext cx="123223" cy="4609090"/>
           </a:xfrm>
           <a:prstGeom prst="rect">
             <a:avLst/>
@@ -3740,7 +3744,7 @@
         </p:nvSpPr>
         <p:spPr>
           <a:xfrm>
-            <a:off x="3505200" y="423022"/>
+            <a:off x="1562100" y="423022"/>
             <a:ext cx="1219200" cy="467684"/>
           </a:xfrm>
           <a:prstGeom prst="rect">
@@ -3812,7 +3816,7 @@
         </p:nvCxnSpPr>
         <p:spPr>
           <a:xfrm>
-            <a:off x="4118600" y="907617"/>
+            <a:off x="2175500" y="907617"/>
             <a:ext cx="12918" cy="2391496"/>
           </a:xfrm>
           <a:prstGeom prst="line">
@@ -3849,7 +3853,7 @@
         </p:nvSpPr>
         <p:spPr>
           <a:xfrm>
-            <a:off x="4046592" y="1365809"/>
+            <a:off x="2103492" y="1365809"/>
             <a:ext cx="156623" cy="1681617"/>
           </a:xfrm>
           <a:prstGeom prst="rect">
@@ -3903,7 +3907,7 @@
         </p:nvCxnSpPr>
         <p:spPr>
           <a:xfrm flipH="1">
-            <a:off x="5599912" y="1613633"/>
+            <a:off x="3656812" y="1613633"/>
             <a:ext cx="2170" cy="1586767"/>
           </a:xfrm>
           <a:prstGeom prst="line">
@@ -3940,7 +3944,7 @@
         </p:nvSpPr>
         <p:spPr>
           <a:xfrm>
-            <a:off x="5525882" y="1613633"/>
+            <a:off x="3582782" y="1613633"/>
             <a:ext cx="152400" cy="276003"/>
           </a:xfrm>
           <a:prstGeom prst="rect">
@@ -3987,7 +3991,7 @@
         </p:nvCxnSpPr>
         <p:spPr>
           <a:xfrm>
-            <a:off x="419100" y="1261999"/>
+            <a:off x="-1524000" y="1261999"/>
             <a:ext cx="1119851" cy="0"/>
           </a:xfrm>
           <a:prstGeom prst="straightConnector1">
@@ -4023,7 +4027,7 @@
         </p:nvSpPr>
         <p:spPr>
           <a:xfrm>
-            <a:off x="-833186" y="849570"/>
+            <a:off x="-2776286" y="849570"/>
             <a:ext cx="2393402" cy="430887"/>
           </a:xfrm>
           <a:prstGeom prst="rect">
@@ -4075,7 +4079,7 @@
         </p:nvCxnSpPr>
         <p:spPr>
           <a:xfrm>
-            <a:off x="4135972" y="1512343"/>
+            <a:off x="2192872" y="1512343"/>
             <a:ext cx="219416" cy="0"/>
           </a:xfrm>
           <a:prstGeom prst="straightConnector1">
@@ -4111,7 +4115,7 @@
         </p:nvSpPr>
         <p:spPr>
           <a:xfrm rot="10800000" flipV="1">
-            <a:off x="2798242" y="3210925"/>
+            <a:off x="855142" y="3210925"/>
             <a:ext cx="776422" cy="215444"/>
           </a:xfrm>
           <a:prstGeom prst="rect">
@@ -4153,7 +4157,7 @@
         </p:nvCxnSpPr>
         <p:spPr>
           <a:xfrm>
-            <a:off x="4203215" y="1878232"/>
+            <a:off x="2260115" y="1878232"/>
             <a:ext cx="1398867" cy="0"/>
           </a:xfrm>
           <a:prstGeom prst="straightConnector1">
@@ -4193,7 +4197,7 @@
         </p:nvCxnSpPr>
         <p:spPr>
           <a:xfrm>
-            <a:off x="1690533" y="3063717"/>
+            <a:off x="-252567" y="3063717"/>
             <a:ext cx="2348067" cy="0"/>
           </a:xfrm>
           <a:prstGeom prst="straightConnector1">
@@ -4231,7 +4235,7 @@
         </p:nvCxnSpPr>
         <p:spPr>
           <a:xfrm>
-            <a:off x="355039" y="4862945"/>
+            <a:off x="-1600200" y="5867400"/>
             <a:ext cx="1196051" cy="0"/>
           </a:xfrm>
           <a:prstGeom prst="straightConnector1">
@@ -4269,7 +4273,7 @@
         </p:nvSpPr>
         <p:spPr>
           <a:xfrm>
-            <a:off x="5514861" y="2077673"/>
+            <a:off x="3571761" y="2077673"/>
             <a:ext cx="170023" cy="866132"/>
           </a:xfrm>
           <a:prstGeom prst="rect">
@@ -4316,7 +4320,7 @@
         </p:nvSpPr>
         <p:spPr>
           <a:xfrm>
-            <a:off x="1597152" y="918401"/>
+            <a:off x="-345948" y="918401"/>
             <a:ext cx="2476884" cy="430887"/>
           </a:xfrm>
           <a:prstGeom prst="rect">
@@ -4368,7 +4372,7 @@
         </p:nvSpPr>
         <p:spPr>
           <a:xfrm>
-            <a:off x="4285108" y="4566971"/>
+            <a:off x="2272948" y="5501708"/>
             <a:ext cx="621216" cy="215444"/>
           </a:xfrm>
           <a:prstGeom prst="rect">
@@ -4408,7 +4412,7 @@
         </p:nvSpPr>
         <p:spPr>
           <a:xfrm>
-            <a:off x="619310" y="4617846"/>
+            <a:off x="-1392850" y="5552583"/>
             <a:ext cx="762000" cy="215444"/>
           </a:xfrm>
           <a:prstGeom prst="rect">
@@ -4448,7 +4452,7 @@
         </p:nvSpPr>
         <p:spPr>
           <a:xfrm>
-            <a:off x="2761949" y="2848273"/>
+            <a:off x="818849" y="2848273"/>
             <a:ext cx="220343" cy="215444"/>
           </a:xfrm>
           <a:prstGeom prst="rect">
@@ -4475,7 +4479,7 @@
           <a:p>
             <a:r>
               <a:rPr lang="en-US" dirty="0"/>
-              <a:t>u</a:t>
+              <a:t>d</a:t>
             </a:r>
           </a:p>
         </p:txBody>
@@ -4488,7 +4492,7 @@
         </p:nvSpPr>
         <p:spPr>
           <a:xfrm>
-            <a:off x="4316435" y="1149960"/>
+            <a:off x="2373335" y="1149960"/>
             <a:ext cx="2660224" cy="461538"/>
           </a:xfrm>
           <a:prstGeom prst="rect">
@@ -4563,7 +4567,7 @@
         </p:nvCxnSpPr>
         <p:spPr>
           <a:xfrm flipV="1">
-            <a:off x="1586322" y="3412801"/>
+            <a:off x="-356778" y="3412801"/>
             <a:ext cx="7309493" cy="55556"/>
           </a:xfrm>
           <a:prstGeom prst="straightConnector1">
@@ -4607,7 +4611,7 @@
         </p:nvCxnSpPr>
         <p:spPr>
           <a:xfrm>
-            <a:off x="1672233" y="1371600"/>
+            <a:off x="-270867" y="1371600"/>
             <a:ext cx="2374359" cy="0"/>
           </a:xfrm>
           <a:prstGeom prst="straightConnector1">
@@ -4650,9 +4654,9 @@
           <p:nvPr/>
         </p:nvCxnSpPr>
         <p:spPr>
-          <a:xfrm>
-            <a:off x="1670963" y="4819643"/>
-            <a:ext cx="7309493" cy="33027"/>
+          <a:xfrm flipV="1">
+            <a:off x="-256827" y="5787407"/>
+            <a:ext cx="7225123" cy="32586"/>
           </a:xfrm>
           <a:prstGeom prst="straightConnector1">
             <a:avLst/>
@@ -4697,7 +4701,7 @@
         </p:nvCxnSpPr>
         <p:spPr>
           <a:xfrm flipV="1">
-            <a:off x="4137729" y="2097846"/>
+            <a:off x="2194629" y="2097846"/>
             <a:ext cx="1385786" cy="535"/>
           </a:xfrm>
           <a:prstGeom prst="straightConnector1">
@@ -4739,7 +4743,7 @@
         </p:nvSpPr>
         <p:spPr>
           <a:xfrm>
-            <a:off x="4212909" y="1881385"/>
+            <a:off x="2269809" y="1881385"/>
             <a:ext cx="855809" cy="215444"/>
           </a:xfrm>
           <a:prstGeom prst="rect">
@@ -4785,7 +4789,7 @@
         </p:nvSpPr>
         <p:spPr>
           <a:xfrm>
-            <a:off x="8143363" y="1985492"/>
+            <a:off x="6200263" y="1985492"/>
             <a:ext cx="1674186" cy="461538"/>
           </a:xfrm>
           <a:prstGeom prst="rect">
@@ -4826,7 +4830,7 @@
                   <a:schemeClr val="bg1"/>
                 </a:solidFill>
               </a:rPr>
-              <a:t>u:DeleteProfilePicCommand</a:t>
+              <a:t>d:DeleteProfilePicCommand</a:t>
             </a:r>
             <a:endParaRPr lang="en-SG" sz="1600" dirty="0">
               <a:solidFill>
@@ -4852,7 +4856,7 @@
         </p:nvCxnSpPr>
         <p:spPr>
           <a:xfrm>
-            <a:off x="9062772" y="3445394"/>
+            <a:off x="7119672" y="3445394"/>
             <a:ext cx="1335278" cy="0"/>
           </a:xfrm>
           <a:prstGeom prst="straightConnector1">
@@ -4894,7 +4898,7 @@
         </p:nvSpPr>
         <p:spPr>
           <a:xfrm>
-            <a:off x="8903666" y="2463805"/>
+            <a:off x="6960566" y="2463805"/>
             <a:ext cx="152400" cy="276003"/>
           </a:xfrm>
           <a:prstGeom prst="rect">
@@ -4950,7 +4954,7 @@
         </p:nvCxnSpPr>
         <p:spPr>
           <a:xfrm>
-            <a:off x="9043784" y="3883910"/>
+            <a:off x="7100684" y="3883910"/>
             <a:ext cx="1959337" cy="0"/>
           </a:xfrm>
           <a:prstGeom prst="straightConnector1">
@@ -4996,8 +5000,8 @@
         </p:nvCxnSpPr>
         <p:spPr>
           <a:xfrm>
-            <a:off x="8980456" y="2492206"/>
-            <a:ext cx="2946" cy="2571143"/>
+            <a:off x="7037357" y="2492206"/>
+            <a:ext cx="33235" cy="3527594"/>
           </a:xfrm>
           <a:prstGeom prst="line">
             <a:avLst/>
@@ -5039,8 +5043,8 @@
         </p:nvSpPr>
         <p:spPr>
           <a:xfrm>
-            <a:off x="8897550" y="3398602"/>
-            <a:ext cx="158516" cy="1478197"/>
+            <a:off x="6954450" y="3398600"/>
+            <a:ext cx="152877" cy="2392599"/>
           </a:xfrm>
           <a:prstGeom prst="rect">
             <a:avLst/>
@@ -5092,7 +5096,7 @@
         </p:nvSpPr>
         <p:spPr>
           <a:xfrm>
-            <a:off x="10926921" y="3607907"/>
+            <a:off x="8983821" y="3607907"/>
             <a:ext cx="152400" cy="276003"/>
           </a:xfrm>
           <a:prstGeom prst="rect">
@@ -5145,7 +5149,7 @@
         </p:nvSpPr>
         <p:spPr>
           <a:xfrm>
-            <a:off x="10398050" y="3154786"/>
+            <a:off x="8454950" y="3154786"/>
             <a:ext cx="1209447" cy="461538"/>
           </a:xfrm>
           <a:prstGeom prst="rect">
@@ -5218,7 +5222,7 @@
         </p:nvSpPr>
         <p:spPr>
           <a:xfrm>
-            <a:off x="9075116" y="3167988"/>
+            <a:off x="7132016" y="3167988"/>
             <a:ext cx="1250270" cy="215444"/>
           </a:xfrm>
           <a:prstGeom prst="rect">
@@ -5274,7 +5278,7 @@
         </p:nvCxnSpPr>
         <p:spPr>
           <a:xfrm flipV="1">
-            <a:off x="5689338" y="2217559"/>
+            <a:off x="3746238" y="2217559"/>
             <a:ext cx="2459717" cy="35987"/>
           </a:xfrm>
           <a:prstGeom prst="straightConnector1">
@@ -5316,7 +5320,7 @@
         </p:nvSpPr>
         <p:spPr>
           <a:xfrm>
-            <a:off x="5599913" y="2000817"/>
+            <a:off x="3656813" y="2000817"/>
             <a:ext cx="2320358" cy="215444"/>
           </a:xfrm>
           <a:prstGeom prst="rect">
@@ -5372,7 +5376,7 @@
         </p:nvCxnSpPr>
         <p:spPr>
           <a:xfrm>
-            <a:off x="5684885" y="2740454"/>
+            <a:off x="3741785" y="2740454"/>
             <a:ext cx="3211069" cy="0"/>
           </a:xfrm>
           <a:prstGeom prst="straightConnector1">
@@ -5418,7 +5422,7 @@
         </p:nvCxnSpPr>
         <p:spPr>
           <a:xfrm>
-            <a:off x="4212909" y="2943804"/>
+            <a:off x="2269809" y="2943804"/>
             <a:ext cx="1268716" cy="0"/>
           </a:xfrm>
           <a:prstGeom prst="straightConnector1">
@@ -5464,8 +5468,8 @@
         </p:nvCxnSpPr>
         <p:spPr>
           <a:xfrm>
-            <a:off x="9043784" y="4458460"/>
-            <a:ext cx="3224416" cy="0"/>
+            <a:off x="7100684" y="4458460"/>
+            <a:ext cx="3719716" cy="0"/>
           </a:xfrm>
           <a:prstGeom prst="straightConnector1">
             <a:avLst/>
@@ -5506,8 +5510,8 @@
         </p:nvSpPr>
         <p:spPr>
           <a:xfrm>
-            <a:off x="9875589" y="3975429"/>
-            <a:ext cx="2296669" cy="430887"/>
+            <a:off x="7200900" y="3769028"/>
+            <a:ext cx="3207637" cy="646331"/>
           </a:xfrm>
           <a:prstGeom prst="rect">
             <a:avLst/>
@@ -5532,20 +5536,24 @@
           </a:lstStyle>
           <a:p>
             <a:r>
+              <a:rPr lang="en-US" dirty="0"/>
+              <a:t>new </a:t>
+            </a:r>
+            <a:r>
               <a:rPr lang="en-US" dirty="0" err="1"/>
-              <a:t>updatePerson</a:t>
+              <a:t>UpdateProfilePicCommand</a:t>
             </a:r>
             <a:r>
               <a:rPr lang="en-US" dirty="0"/>
-              <a:t>(INDEX_PERSON, </a:t>
+              <a:t>(INDEX_PERSON, new </a:t>
             </a:r>
             <a:r>
               <a:rPr lang="en-US" dirty="0" err="1"/>
-              <a:t>Person_updated</a:t>
+              <a:t>ProfilePic</a:t>
             </a:r>
             <a:r>
               <a:rPr lang="en-US" dirty="0"/>
-              <a:t>)</a:t>
+              <a:t>())</a:t>
             </a:r>
           </a:p>
         </p:txBody>
@@ -5561,13 +5569,560 @@
           </p:cNvPr>
           <p:cNvCxnSpPr>
             <a:cxnSpLocks/>
+            <a:endCxn id="50" idx="2"/>
           </p:cNvCxnSpPr>
           <p:nvPr/>
         </p:nvCxnSpPr>
         <p:spPr>
           <a:xfrm>
-            <a:off x="9062772" y="4701165"/>
-            <a:ext cx="3205428" cy="0"/>
+            <a:off x="7132016" y="4903806"/>
+            <a:ext cx="4535621" cy="0"/>
+          </a:xfrm>
+          <a:prstGeom prst="straightConnector1">
+            <a:avLst/>
+          </a:prstGeom>
+          <a:ln w="19050">
+            <a:solidFill>
+              <a:srgbClr val="0070C0"/>
+            </a:solidFill>
+            <a:prstDash val="sysDash"/>
+            <a:headEnd type="arrow" w="med" len="med"/>
+            <a:tailEnd type="none" w="med" len="med"/>
+          </a:ln>
+        </p:spPr>
+        <p:style>
+          <a:lnRef idx="1">
+            <a:schemeClr val="accent1"/>
+          </a:lnRef>
+          <a:fillRef idx="0">
+            <a:schemeClr val="accent1"/>
+          </a:fillRef>
+          <a:effectRef idx="0">
+            <a:schemeClr val="accent1"/>
+          </a:effectRef>
+          <a:fontRef idx="minor">
+            <a:schemeClr val="tx1"/>
+          </a:fontRef>
+        </p:style>
+      </p:cxnSp>
+      <p:sp>
+        <p:nvSpPr>
+          <p:cNvPr id="49" name="Rectangle 62">
+            <a:extLst>
+              <a:ext uri="{FF2B5EF4-FFF2-40B4-BE49-F238E27FC236}">
+                <a16:creationId xmlns:a16="http://schemas.microsoft.com/office/drawing/2014/main" id="{8C15B798-E42A-48E1-B69B-24E46C6F649E}"/>
+              </a:ext>
+            </a:extLst>
+          </p:cNvPr>
+          <p:cNvSpPr/>
+          <p:nvPr/>
+        </p:nvSpPr>
+        <p:spPr>
+          <a:xfrm>
+            <a:off x="10831134" y="4149490"/>
+            <a:ext cx="1742932" cy="461538"/>
+          </a:xfrm>
+          <a:prstGeom prst="rect">
+            <a:avLst/>
+          </a:prstGeom>
+          <a:solidFill>
+            <a:srgbClr val="0070C0"/>
+          </a:solidFill>
+          <a:ln w="19050">
+            <a:solidFill>
+              <a:srgbClr val="0070C0"/>
+            </a:solidFill>
+          </a:ln>
+          <a:effectLst/>
+        </p:spPr>
+        <p:style>
+          <a:lnRef idx="1">
+            <a:schemeClr val="accent2"/>
+          </a:lnRef>
+          <a:fillRef idx="2">
+            <a:schemeClr val="accent2"/>
+          </a:fillRef>
+          <a:effectRef idx="1">
+            <a:schemeClr val="accent2"/>
+          </a:effectRef>
+          <a:fontRef idx="minor">
+            <a:schemeClr val="dk1"/>
+          </a:fontRef>
+        </p:style>
+        <p:txBody>
+          <a:bodyPr rtlCol="0" anchor="ctr"/>
+          <a:lstStyle/>
+          <a:p>
+            <a:pPr algn="ctr"/>
+            <a:r>
+              <a:rPr lang="en-US" sz="1600" dirty="0">
+                <a:solidFill>
+                  <a:schemeClr val="bg1"/>
+                </a:solidFill>
+              </a:rPr>
+              <a:t>u:UpdateProfilePicCommand</a:t>
+            </a:r>
+            <a:endParaRPr lang="en-SG" sz="1600" dirty="0">
+              <a:solidFill>
+                <a:schemeClr val="bg1"/>
+              </a:solidFill>
+            </a:endParaRPr>
+          </a:p>
+        </p:txBody>
+      </p:sp>
+      <p:sp>
+        <p:nvSpPr>
+          <p:cNvPr id="50" name="Rectangle 49">
+            <a:extLst>
+              <a:ext uri="{FF2B5EF4-FFF2-40B4-BE49-F238E27FC236}">
+                <a16:creationId xmlns:a16="http://schemas.microsoft.com/office/drawing/2014/main" id="{985B0066-5A36-4384-A57A-75FB45E562CB}"/>
+              </a:ext>
+            </a:extLst>
+          </p:cNvPr>
+          <p:cNvSpPr/>
+          <p:nvPr/>
+        </p:nvSpPr>
+        <p:spPr>
+          <a:xfrm>
+            <a:off x="11591437" y="4627803"/>
+            <a:ext cx="152400" cy="276003"/>
+          </a:xfrm>
+          <a:prstGeom prst="rect">
+            <a:avLst/>
+          </a:prstGeom>
+          <a:solidFill>
+            <a:srgbClr val="0070C0"/>
+          </a:solidFill>
+          <a:ln>
+            <a:solidFill>
+              <a:srgbClr val="0070C0"/>
+            </a:solidFill>
+          </a:ln>
+          <a:effectLst/>
+        </p:spPr>
+        <p:style>
+          <a:lnRef idx="1">
+            <a:schemeClr val="accent3"/>
+          </a:lnRef>
+          <a:fillRef idx="2">
+            <a:schemeClr val="accent3"/>
+          </a:fillRef>
+          <a:effectRef idx="1">
+            <a:schemeClr val="accent3"/>
+          </a:effectRef>
+          <a:fontRef idx="minor">
+            <a:schemeClr val="dk1"/>
+          </a:fontRef>
+        </p:style>
+        <p:txBody>
+          <a:bodyPr rtlCol="0" anchor="ctr"/>
+          <a:lstStyle/>
+          <a:p>
+            <a:pPr algn="ctr"/>
+            <a:endParaRPr lang="en-SG" sz="1400"/>
+          </a:p>
+        </p:txBody>
+      </p:sp>
+      <p:cxnSp>
+        <p:nvCxnSpPr>
+          <p:cNvPr id="54" name="Straight Connector 53">
+            <a:extLst>
+              <a:ext uri="{FF2B5EF4-FFF2-40B4-BE49-F238E27FC236}">
+                <a16:creationId xmlns:a16="http://schemas.microsoft.com/office/drawing/2014/main" id="{7A7883DD-8159-4907-A4BB-50ED86894B18}"/>
+              </a:ext>
+            </a:extLst>
+          </p:cNvPr>
+          <p:cNvCxnSpPr>
+            <a:cxnSpLocks/>
+          </p:cNvCxnSpPr>
+          <p:nvPr/>
+        </p:nvCxnSpPr>
+        <p:spPr>
+          <a:xfrm>
+            <a:off x="11667637" y="4652839"/>
+            <a:ext cx="0" cy="1366961"/>
+          </a:xfrm>
+          <a:prstGeom prst="line">
+            <a:avLst/>
+          </a:prstGeom>
+          <a:ln w="19050">
+            <a:solidFill>
+              <a:srgbClr val="0070C0"/>
+            </a:solidFill>
+            <a:prstDash val="sysDash"/>
+          </a:ln>
+          <a:effectLst/>
+        </p:spPr>
+        <p:style>
+          <a:lnRef idx="1">
+            <a:schemeClr val="accent1"/>
+          </a:lnRef>
+          <a:fillRef idx="2">
+            <a:schemeClr val="accent1"/>
+          </a:fillRef>
+          <a:effectRef idx="1">
+            <a:schemeClr val="accent1"/>
+          </a:effectRef>
+          <a:fontRef idx="minor">
+            <a:schemeClr val="dk1"/>
+          </a:fontRef>
+        </p:style>
+      </p:cxnSp>
+      <p:sp>
+        <p:nvSpPr>
+          <p:cNvPr id="56" name="Rectangle 55">
+            <a:extLst>
+              <a:ext uri="{FF2B5EF4-FFF2-40B4-BE49-F238E27FC236}">
+                <a16:creationId xmlns:a16="http://schemas.microsoft.com/office/drawing/2014/main" id="{69AD26CB-37A7-47F4-999A-000F860E6867}"/>
+              </a:ext>
+            </a:extLst>
+          </p:cNvPr>
+          <p:cNvSpPr/>
+          <p:nvPr/>
+        </p:nvSpPr>
+        <p:spPr>
+          <a:xfrm>
+            <a:off x="11585321" y="5169023"/>
+            <a:ext cx="152932" cy="489624"/>
+          </a:xfrm>
+          <a:prstGeom prst="rect">
+            <a:avLst/>
+          </a:prstGeom>
+          <a:solidFill>
+            <a:srgbClr val="0070C0"/>
+          </a:solidFill>
+          <a:ln>
+            <a:solidFill>
+              <a:srgbClr val="0070C0"/>
+            </a:solidFill>
+          </a:ln>
+          <a:effectLst/>
+        </p:spPr>
+        <p:style>
+          <a:lnRef idx="1">
+            <a:schemeClr val="accent3"/>
+          </a:lnRef>
+          <a:fillRef idx="2">
+            <a:schemeClr val="accent3"/>
+          </a:fillRef>
+          <a:effectRef idx="1">
+            <a:schemeClr val="accent3"/>
+          </a:effectRef>
+          <a:fontRef idx="minor">
+            <a:schemeClr val="dk1"/>
+          </a:fontRef>
+        </p:style>
+        <p:txBody>
+          <a:bodyPr rtlCol="0" anchor="ctr"/>
+          <a:lstStyle/>
+          <a:p>
+            <a:pPr algn="ctr"/>
+            <a:endParaRPr lang="en-SG"/>
+          </a:p>
+        </p:txBody>
+      </p:sp>
+      <p:cxnSp>
+        <p:nvCxnSpPr>
+          <p:cNvPr id="58" name="Straight Arrow Connector 57">
+            <a:extLst>
+              <a:ext uri="{FF2B5EF4-FFF2-40B4-BE49-F238E27FC236}">
+                <a16:creationId xmlns:a16="http://schemas.microsoft.com/office/drawing/2014/main" id="{DCCEFE5F-9B05-450A-8D66-6775C5D4CDB0}"/>
+              </a:ext>
+            </a:extLst>
+          </p:cNvPr>
+          <p:cNvCxnSpPr>
+            <a:cxnSpLocks/>
+          </p:cNvCxnSpPr>
+          <p:nvPr/>
+        </p:nvCxnSpPr>
+        <p:spPr>
+          <a:xfrm>
+            <a:off x="7111418" y="5181600"/>
+            <a:ext cx="4473903" cy="0"/>
+          </a:xfrm>
+          <a:prstGeom prst="straightConnector1">
+            <a:avLst/>
+          </a:prstGeom>
+          <a:ln w="19050">
+            <a:solidFill>
+              <a:srgbClr val="0070C0"/>
+            </a:solidFill>
+            <a:tailEnd type="arrow"/>
+          </a:ln>
+        </p:spPr>
+        <p:style>
+          <a:lnRef idx="1">
+            <a:schemeClr val="accent1"/>
+          </a:lnRef>
+          <a:fillRef idx="0">
+            <a:schemeClr val="accent1"/>
+          </a:fillRef>
+          <a:effectRef idx="0">
+            <a:schemeClr val="accent1"/>
+          </a:effectRef>
+          <a:fontRef idx="minor">
+            <a:schemeClr val="tx1"/>
+          </a:fontRef>
+        </p:style>
+      </p:cxnSp>
+      <p:sp>
+        <p:nvSpPr>
+          <p:cNvPr id="60" name="TextBox 59">
+            <a:extLst>
+              <a:ext uri="{FF2B5EF4-FFF2-40B4-BE49-F238E27FC236}">
+                <a16:creationId xmlns:a16="http://schemas.microsoft.com/office/drawing/2014/main" id="{CD0119E1-8122-4228-A420-8006D0BB4542}"/>
+              </a:ext>
+            </a:extLst>
+          </p:cNvPr>
+          <p:cNvSpPr txBox="1"/>
+          <p:nvPr/>
+        </p:nvSpPr>
+        <p:spPr>
+          <a:xfrm>
+            <a:off x="8989840" y="4626013"/>
+            <a:ext cx="220343" cy="215444"/>
+          </a:xfrm>
+          <a:prstGeom prst="rect">
+            <a:avLst/>
+          </a:prstGeom>
+          <a:noFill/>
+        </p:spPr>
+        <p:txBody>
+          <a:bodyPr wrap="square" lIns="0" tIns="0" rIns="0" bIns="0" rtlCol="0">
+            <a:spAutoFit/>
+          </a:bodyPr>
+          <a:lstStyle>
+            <a:defPPr>
+              <a:defRPr lang="en-US"/>
+            </a:defPPr>
+            <a:lvl1pPr algn="r">
+              <a:defRPr sz="1400">
+                <a:solidFill>
+                  <a:srgbClr val="0070C0"/>
+                </a:solidFill>
+              </a:defRPr>
+            </a:lvl1pPr>
+          </a:lstStyle>
+          <a:p>
+            <a:r>
+              <a:rPr lang="en-US" dirty="0"/>
+              <a:t>u</a:t>
+            </a:r>
+          </a:p>
+        </p:txBody>
+      </p:sp>
+      <p:sp>
+        <p:nvSpPr>
+          <p:cNvPr id="61" name="TextBox 60">
+            <a:extLst>
+              <a:ext uri="{FF2B5EF4-FFF2-40B4-BE49-F238E27FC236}">
+                <a16:creationId xmlns:a16="http://schemas.microsoft.com/office/drawing/2014/main" id="{765C82AF-1DA9-4B12-850C-F0F7842982CA}"/>
+              </a:ext>
+            </a:extLst>
+          </p:cNvPr>
+          <p:cNvSpPr txBox="1"/>
+          <p:nvPr/>
+        </p:nvSpPr>
+        <p:spPr>
+          <a:xfrm rot="10800000" flipV="1">
+            <a:off x="8748010" y="4928692"/>
+            <a:ext cx="776422" cy="215444"/>
+          </a:xfrm>
+          <a:prstGeom prst="rect">
+            <a:avLst/>
+          </a:prstGeom>
+          <a:noFill/>
+        </p:spPr>
+        <p:txBody>
+          <a:bodyPr wrap="square" lIns="0" tIns="0" rIns="0" bIns="0" rtlCol="0">
+            <a:spAutoFit/>
+          </a:bodyPr>
+          <a:lstStyle>
+            <a:defPPr>
+              <a:defRPr lang="en-US"/>
+            </a:defPPr>
+            <a:lvl1pPr algn="r">
+              <a:defRPr sz="1400">
+                <a:solidFill>
+                  <a:srgbClr val="0070C0"/>
+                </a:solidFill>
+              </a:defRPr>
+            </a:lvl1pPr>
+          </a:lstStyle>
+          <a:p>
+            <a:r>
+              <a:rPr lang="en-US" dirty="0"/>
+              <a:t>execute()</a:t>
+            </a:r>
+          </a:p>
+        </p:txBody>
+      </p:sp>
+      <p:cxnSp>
+        <p:nvCxnSpPr>
+          <p:cNvPr id="62" name="Straight Arrow Connector 61">
+            <a:extLst>
+              <a:ext uri="{FF2B5EF4-FFF2-40B4-BE49-F238E27FC236}">
+                <a16:creationId xmlns:a16="http://schemas.microsoft.com/office/drawing/2014/main" id="{B970C3E7-8F42-44FA-ADCB-C52C26164C77}"/>
+              </a:ext>
+            </a:extLst>
+          </p:cNvPr>
+          <p:cNvCxnSpPr>
+            <a:cxnSpLocks/>
+          </p:cNvCxnSpPr>
+          <p:nvPr/>
+        </p:nvCxnSpPr>
+        <p:spPr>
+          <a:xfrm>
+            <a:off x="7131426" y="5658647"/>
+            <a:ext cx="4535621" cy="0"/>
+          </a:xfrm>
+          <a:prstGeom prst="straightConnector1">
+            <a:avLst/>
+          </a:prstGeom>
+          <a:ln w="19050">
+            <a:solidFill>
+              <a:srgbClr val="0070C0"/>
+            </a:solidFill>
+            <a:prstDash val="sysDash"/>
+            <a:headEnd type="arrow" w="med" len="med"/>
+            <a:tailEnd type="none" w="med" len="med"/>
+          </a:ln>
+        </p:spPr>
+        <p:style>
+          <a:lnRef idx="1">
+            <a:schemeClr val="accent1"/>
+          </a:lnRef>
+          <a:fillRef idx="0">
+            <a:schemeClr val="accent1"/>
+          </a:fillRef>
+          <a:effectRef idx="0">
+            <a:schemeClr val="accent1"/>
+          </a:effectRef>
+          <a:fontRef idx="minor">
+            <a:schemeClr val="tx1"/>
+          </a:fontRef>
+        </p:style>
+      </p:cxnSp>
+      <p:cxnSp>
+        <p:nvCxnSpPr>
+          <p:cNvPr id="73" name="Straight Arrow Connector 72">
+            <a:extLst>
+              <a:ext uri="{FF2B5EF4-FFF2-40B4-BE49-F238E27FC236}">
+                <a16:creationId xmlns:a16="http://schemas.microsoft.com/office/drawing/2014/main" id="{02A30119-3365-4134-9872-5796E61DA36C}"/>
+              </a:ext>
+            </a:extLst>
+          </p:cNvPr>
+          <p:cNvCxnSpPr>
+            <a:cxnSpLocks/>
+          </p:cNvCxnSpPr>
+          <p:nvPr/>
+        </p:nvCxnSpPr>
+        <p:spPr>
+          <a:xfrm>
+            <a:off x="11750598" y="5270844"/>
+            <a:ext cx="1335278" cy="0"/>
+          </a:xfrm>
+          <a:prstGeom prst="straightConnector1">
+            <a:avLst/>
+          </a:prstGeom>
+          <a:ln w="19050">
+            <a:solidFill>
+              <a:srgbClr val="0070C0"/>
+            </a:solidFill>
+            <a:tailEnd type="arrow"/>
+          </a:ln>
+        </p:spPr>
+        <p:style>
+          <a:lnRef idx="1">
+            <a:schemeClr val="accent1"/>
+          </a:lnRef>
+          <a:fillRef idx="0">
+            <a:schemeClr val="accent1"/>
+          </a:fillRef>
+          <a:effectRef idx="0">
+            <a:schemeClr val="accent1"/>
+          </a:effectRef>
+          <a:fontRef idx="minor">
+            <a:schemeClr val="tx1"/>
+          </a:fontRef>
+        </p:style>
+      </p:cxnSp>
+      <p:sp>
+        <p:nvSpPr>
+          <p:cNvPr id="74" name="TextBox 73">
+            <a:extLst>
+              <a:ext uri="{FF2B5EF4-FFF2-40B4-BE49-F238E27FC236}">
+                <a16:creationId xmlns:a16="http://schemas.microsoft.com/office/drawing/2014/main" id="{733ACAF0-B6BB-42E2-BBD9-D8C1BE9E18E9}"/>
+              </a:ext>
+            </a:extLst>
+          </p:cNvPr>
+          <p:cNvSpPr txBox="1"/>
+          <p:nvPr/>
+        </p:nvSpPr>
+        <p:spPr>
+          <a:xfrm>
+            <a:off x="11712983" y="4782415"/>
+            <a:ext cx="2296669" cy="430887"/>
+          </a:xfrm>
+          <a:prstGeom prst="rect">
+            <a:avLst/>
+          </a:prstGeom>
+          <a:noFill/>
+        </p:spPr>
+        <p:txBody>
+          <a:bodyPr wrap="square" lIns="0" tIns="0" rIns="0" bIns="0" rtlCol="0">
+            <a:spAutoFit/>
+          </a:bodyPr>
+          <a:lstStyle>
+            <a:defPPr>
+              <a:defRPr lang="en-US"/>
+            </a:defPPr>
+            <a:lvl1pPr algn="r">
+              <a:defRPr sz="1400">
+                <a:solidFill>
+                  <a:srgbClr val="0070C0"/>
+                </a:solidFill>
+              </a:defRPr>
+            </a:lvl1pPr>
+          </a:lstStyle>
+          <a:p>
+            <a:r>
+              <a:rPr lang="en-US" dirty="0" err="1"/>
+              <a:t>updatePerson</a:t>
+            </a:r>
+            <a:r>
+              <a:rPr lang="en-US" dirty="0"/>
+              <a:t>(INDEX_PERSON, </a:t>
+            </a:r>
+            <a:r>
+              <a:rPr lang="en-US" dirty="0" err="1"/>
+              <a:t>Person_updated</a:t>
+            </a:r>
+            <a:r>
+              <a:rPr lang="en-US" dirty="0"/>
+              <a:t>)</a:t>
+            </a:r>
+          </a:p>
+        </p:txBody>
+      </p:sp>
+      <p:cxnSp>
+        <p:nvCxnSpPr>
+          <p:cNvPr id="75" name="Straight Arrow Connector 74">
+            <a:extLst>
+              <a:ext uri="{FF2B5EF4-FFF2-40B4-BE49-F238E27FC236}">
+                <a16:creationId xmlns:a16="http://schemas.microsoft.com/office/drawing/2014/main" id="{DDEA0E6D-9E90-47C1-ADB7-0D0B4C2FB350}"/>
+              </a:ext>
+            </a:extLst>
+          </p:cNvPr>
+          <p:cNvCxnSpPr>
+            <a:cxnSpLocks/>
+          </p:cNvCxnSpPr>
+          <p:nvPr/>
+        </p:nvCxnSpPr>
+        <p:spPr>
+          <a:xfrm>
+            <a:off x="11712983" y="5462775"/>
+            <a:ext cx="1372893" cy="0"/>
           </a:xfrm>
           <a:prstGeom prst="straightConnector1">
             <a:avLst/>

</xml_diff>